<commit_message>
ADDING PPT OF GIT ASSIGNMENT BY PIYUSH AGRAWAL
</commit_message>
<xml_diff>
--- a/GIT ASSIGNMENT by Group 12.pptx
+++ b/GIT ASSIGNMENT by Group 12.pptx
@@ -10,21 +10,22 @@
   <p:sldIdLst>
     <p:sldId id="256" r:id="rId6"/>
     <p:sldId id="257" r:id="rId7"/>
+    <p:sldId id="258" r:id="rId8"/>
   </p:sldIdLst>
   <p:sldSz cy="5143500" cx="9144000"/>
   <p:notesSz cx="6858000" cy="9144000"/>
   <p:embeddedFontLst>
     <p:embeddedFont>
       <p:font typeface="Roboto Slab"/>
-      <p:regular r:id="rId8"/>
-      <p:bold r:id="rId9"/>
+      <p:regular r:id="rId9"/>
+      <p:bold r:id="rId10"/>
     </p:embeddedFont>
     <p:embeddedFont>
       <p:font typeface="Roboto"/>
-      <p:regular r:id="rId10"/>
-      <p:bold r:id="rId11"/>
-      <p:italic r:id="rId12"/>
-      <p:boldItalic r:id="rId13"/>
+      <p:regular r:id="rId11"/>
+      <p:bold r:id="rId12"/>
+      <p:italic r:id="rId13"/>
+      <p:boldItalic r:id="rId14"/>
     </p:embeddedFont>
   </p:embeddedFontLst>
   <p:defaultTextStyle>
@@ -819,7 +820,7 @@
       </p:grpSpPr>
       <p:sp>
         <p:nvSpPr>
-          <p:cNvPr id="69" name="Google Shape;69;gabb94e76bb_1_0:notes"/>
+          <p:cNvPr id="69" name="Google Shape;69;gabb94e76bb_0_15:notes"/>
           <p:cNvSpPr/>
           <p:nvPr>
             <p:ph idx="2" type="sldImg"/>
@@ -854,7 +855,106 @@
       </p:sp>
       <p:sp>
         <p:nvSpPr>
-          <p:cNvPr id="70" name="Google Shape;70;gabb94e76bb_1_0:notes"/>
+          <p:cNvPr id="70" name="Google Shape;70;gabb94e76bb_0_15:notes"/>
+          <p:cNvSpPr txBox="1"/>
+          <p:nvPr>
+            <p:ph idx="1" type="body"/>
+          </p:nvPr>
+        </p:nvSpPr>
+        <p:spPr>
+          <a:xfrm>
+            <a:off x="685800" y="4343400"/>
+            <a:ext cx="5486400" cy="4114800"/>
+          </a:xfrm>
+          <a:prstGeom prst="rect">
+            <a:avLst/>
+          </a:prstGeom>
+        </p:spPr>
+        <p:txBody>
+          <a:bodyPr anchorCtr="0" anchor="t" bIns="91425" lIns="91425" spcFirstLastPara="1" rIns="91425" wrap="square" tIns="91425">
+            <a:noAutofit/>
+          </a:bodyPr>
+          <a:lstStyle/>
+          <a:p>
+            <a:pPr indent="0" lvl="0" marL="0" rtl="0" algn="l">
+              <a:spcBef>
+                <a:spcPts val="0"/>
+              </a:spcBef>
+              <a:spcAft>
+                <a:spcPts val="0"/>
+              </a:spcAft>
+              <a:buNone/>
+            </a:pPr>
+            <a:r>
+              <a:t/>
+            </a:r>
+            <a:endParaRPr/>
+          </a:p>
+        </p:txBody>
+      </p:sp>
+    </p:spTree>
+  </p:cSld>
+  <p:clrMapOvr>
+    <a:masterClrMapping/>
+  </p:clrMapOvr>
+</p:notes>
+</file>
+
+<file path=ppt/notesSlides/notesSlide3.xml><?xml version="1.0" encoding="utf-8"?>
+<p:notes xmlns:a="http://schemas.openxmlformats.org/drawingml/2006/main" xmlns:r="http://schemas.openxmlformats.org/officeDocument/2006/relationships" xmlns:mc="http://schemas.openxmlformats.org/markup-compatibility/2006" xmlns:mv="urn:schemas-microsoft-com:mac:vml" xmlns:p="http://schemas.openxmlformats.org/presentationml/2006/main" xmlns:c="http://schemas.openxmlformats.org/drawingml/2006/chart" xmlns:dgm="http://schemas.openxmlformats.org/drawingml/2006/diagram" xmlns:o="urn:schemas-microsoft-com:office:office" xmlns:v="urn:schemas-microsoft-com:vml" xmlns:pvml="urn:schemas-microsoft-com:office:powerpoint" xmlns:com="http://schemas.openxmlformats.org/drawingml/2006/compatibility" xmlns:p14="http://schemas.microsoft.com/office/powerpoint/2010/main" xmlns:p15="http://schemas.microsoft.com/office/powerpoint/2012/main" xmlns:ahyp="http://schemas.microsoft.com/office/drawing/2018/hyperlinkcolor" showMasterPhAnim="0" showMasterSp="0">
+  <p:cSld>
+    <p:spTree>
+      <p:nvGrpSpPr>
+        <p:cNvPr id="74" name="Shape 74"/>
+        <p:cNvGrpSpPr/>
+        <p:nvPr/>
+      </p:nvGrpSpPr>
+      <p:grpSpPr>
+        <a:xfrm>
+          <a:off x="0" y="0"/>
+          <a:ext cx="0" cy="0"/>
+          <a:chOff x="0" y="0"/>
+          <a:chExt cx="0" cy="0"/>
+        </a:xfrm>
+      </p:grpSpPr>
+      <p:sp>
+        <p:nvSpPr>
+          <p:cNvPr id="75" name="Google Shape;75;gabb94e76bb_1_0:notes"/>
+          <p:cNvSpPr/>
+          <p:nvPr>
+            <p:ph idx="2" type="sldImg"/>
+          </p:nvPr>
+        </p:nvSpPr>
+        <p:spPr>
+          <a:xfrm>
+            <a:off x="381300" y="685800"/>
+            <a:ext cx="6096000" cy="3429000"/>
+          </a:xfrm>
+          <a:custGeom>
+            <a:rect b="b" l="l" r="r" t="t"/>
+            <a:pathLst>
+              <a:path extrusionOk="0" h="120000" w="120000">
+                <a:moveTo>
+                  <a:pt x="0" y="0"/>
+                </a:moveTo>
+                <a:lnTo>
+                  <a:pt x="120000" y="0"/>
+                </a:lnTo>
+                <a:lnTo>
+                  <a:pt x="120000" y="120000"/>
+                </a:lnTo>
+                <a:lnTo>
+                  <a:pt x="0" y="120000"/>
+                </a:lnTo>
+                <a:close/>
+              </a:path>
+            </a:pathLst>
+          </a:custGeom>
+        </p:spPr>
+      </p:sp>
+      <p:sp>
+        <p:nvSpPr>
+          <p:cNvPr id="76" name="Google Shape;76;gabb94e76bb_1_0:notes"/>
           <p:cNvSpPr txBox="1"/>
           <p:nvPr>
             <p:ph idx="1" type="body"/>
@@ -6404,6 +6504,331 @@
         </p:nvSpPr>
         <p:spPr>
           <a:xfrm>
+            <a:off x="71450" y="91575"/>
+            <a:ext cx="8953500" cy="701400"/>
+          </a:xfrm>
+          <a:prstGeom prst="rect">
+            <a:avLst/>
+          </a:prstGeom>
+        </p:spPr>
+        <p:txBody>
+          <a:bodyPr anchorCtr="0" anchor="b" bIns="91425" lIns="91425" spcFirstLastPara="1" rIns="91425" wrap="square" tIns="91425">
+            <a:noAutofit/>
+          </a:bodyPr>
+          <a:lstStyle/>
+          <a:p>
+            <a:pPr indent="0" lvl="0" marL="0" rtl="0" algn="ctr">
+              <a:spcBef>
+                <a:spcPts val="0"/>
+              </a:spcBef>
+              <a:spcAft>
+                <a:spcPts val="0"/>
+              </a:spcAft>
+              <a:buNone/>
+            </a:pPr>
+            <a:r>
+              <a:rPr lang="en"/>
+              <a:t>Explained “GIT ADD”</a:t>
+            </a:r>
+            <a:endParaRPr/>
+          </a:p>
+        </p:txBody>
+      </p:sp>
+      <p:sp>
+        <p:nvSpPr>
+          <p:cNvPr id="73" name="Google Shape;73;p14"/>
+          <p:cNvSpPr txBox="1"/>
+          <p:nvPr/>
+        </p:nvSpPr>
+        <p:spPr>
+          <a:xfrm>
+            <a:off x="1654975" y="792975"/>
+            <a:ext cx="5881800" cy="3588600"/>
+          </a:xfrm>
+          <a:prstGeom prst="rect">
+            <a:avLst/>
+          </a:prstGeom>
+          <a:noFill/>
+          <a:ln>
+            <a:noFill/>
+          </a:ln>
+        </p:spPr>
+        <p:txBody>
+          <a:bodyPr anchorCtr="0" anchor="t" bIns="91425" lIns="91425" spcFirstLastPara="1" rIns="91425" wrap="square" tIns="91425">
+            <a:noAutofit/>
+          </a:bodyPr>
+          <a:lstStyle/>
+          <a:p>
+            <a:pPr indent="0" lvl="0" marL="0" rtl="0" algn="just">
+              <a:lnSpc>
+                <a:spcPct val="115000"/>
+              </a:lnSpc>
+              <a:spcBef>
+                <a:spcPts val="0"/>
+              </a:spcBef>
+              <a:spcAft>
+                <a:spcPts val="0"/>
+              </a:spcAft>
+              <a:buNone/>
+            </a:pPr>
+            <a:r>
+              <a:rPr lang="en" sz="1800">
+                <a:solidFill>
+                  <a:srgbClr val="FFFFFF"/>
+                </a:solidFill>
+              </a:rPr>
+              <a:t>The </a:t>
+            </a:r>
+            <a:r>
+              <a:rPr b="1" lang="en" sz="1800">
+                <a:solidFill>
+                  <a:srgbClr val="FFFFFF"/>
+                </a:solidFill>
+              </a:rPr>
+              <a:t>git add</a:t>
+            </a:r>
+            <a:r>
+              <a:rPr lang="en" sz="1800">
+                <a:solidFill>
+                  <a:srgbClr val="FFFFFF"/>
+                </a:solidFill>
+              </a:rPr>
+              <a:t> command adds a change in the working directory to the staging area. It tells </a:t>
+            </a:r>
+            <a:r>
+              <a:rPr b="1" lang="en" sz="1800">
+                <a:solidFill>
+                  <a:srgbClr val="FFFFFF"/>
+                </a:solidFill>
+              </a:rPr>
+              <a:t>Git</a:t>
+            </a:r>
+            <a:r>
+              <a:rPr lang="en" sz="1800">
+                <a:solidFill>
+                  <a:srgbClr val="FFFFFF"/>
+                </a:solidFill>
+              </a:rPr>
+              <a:t> that you want to include updates to a particular file in the next commit. However, </a:t>
+            </a:r>
+            <a:r>
+              <a:rPr b="1" lang="en" sz="1800">
+                <a:solidFill>
+                  <a:srgbClr val="FFFFFF"/>
+                </a:solidFill>
+              </a:rPr>
+              <a:t>git add</a:t>
+            </a:r>
+            <a:r>
+              <a:rPr lang="en" sz="1800">
+                <a:solidFill>
+                  <a:srgbClr val="FFFFFF"/>
+                </a:solidFill>
+              </a:rPr>
+              <a:t> doesn't really affect the repository in any significant way—changes are not actually recorded until you run </a:t>
+            </a:r>
+            <a:r>
+              <a:rPr b="1" lang="en" sz="1800">
+                <a:solidFill>
+                  <a:srgbClr val="FFFFFF"/>
+                </a:solidFill>
+              </a:rPr>
+              <a:t>git</a:t>
+            </a:r>
+            <a:r>
+              <a:rPr lang="en" sz="1800">
+                <a:solidFill>
+                  <a:srgbClr val="FFFFFF"/>
+                </a:solidFill>
+              </a:rPr>
+              <a:t> commit .</a:t>
+            </a:r>
+            <a:endParaRPr sz="1800">
+              <a:solidFill>
+                <a:srgbClr val="FFFFFF"/>
+              </a:solidFill>
+            </a:endParaRPr>
+          </a:p>
+          <a:p>
+            <a:pPr indent="0" lvl="0" marL="0" rtl="0" algn="just">
+              <a:lnSpc>
+                <a:spcPct val="115000"/>
+              </a:lnSpc>
+              <a:spcBef>
+                <a:spcPts val="0"/>
+              </a:spcBef>
+              <a:spcAft>
+                <a:spcPts val="0"/>
+              </a:spcAft>
+              <a:buNone/>
+            </a:pPr>
+            <a:r>
+              <a:t/>
+            </a:r>
+            <a:endParaRPr b="1" sz="1800">
+              <a:solidFill>
+                <a:srgbClr val="FFFFFF"/>
+              </a:solidFill>
+            </a:endParaRPr>
+          </a:p>
+          <a:p>
+            <a:pPr indent="0" lvl="0" marL="0" rtl="0" algn="just">
+              <a:lnSpc>
+                <a:spcPct val="115000"/>
+              </a:lnSpc>
+              <a:spcBef>
+                <a:spcPts val="0"/>
+              </a:spcBef>
+              <a:spcAft>
+                <a:spcPts val="0"/>
+              </a:spcAft>
+              <a:buNone/>
+            </a:pPr>
+            <a:r>
+              <a:rPr b="1" i="1" lang="en" sz="1800">
+                <a:solidFill>
+                  <a:srgbClr val="FFFFFF"/>
+                </a:solidFill>
+              </a:rPr>
+              <a:t>Syntax :-</a:t>
+            </a:r>
+            <a:endParaRPr b="1" i="1" sz="1800">
+              <a:solidFill>
+                <a:srgbClr val="FFFFFF"/>
+              </a:solidFill>
+            </a:endParaRPr>
+          </a:p>
+          <a:p>
+            <a:pPr indent="0" lvl="0" marL="0" rtl="0" algn="just">
+              <a:lnSpc>
+                <a:spcPct val="115000"/>
+              </a:lnSpc>
+              <a:spcBef>
+                <a:spcPts val="0"/>
+              </a:spcBef>
+              <a:spcAft>
+                <a:spcPts val="0"/>
+              </a:spcAft>
+              <a:buNone/>
+            </a:pPr>
+            <a:r>
+              <a:t/>
+            </a:r>
+            <a:endParaRPr>
+              <a:solidFill>
+                <a:srgbClr val="FFFFFF"/>
+              </a:solidFill>
+            </a:endParaRPr>
+          </a:p>
+          <a:p>
+            <a:pPr indent="0" lvl="0" marL="0" rtl="0" algn="just">
+              <a:lnSpc>
+                <a:spcPct val="115000"/>
+              </a:lnSpc>
+              <a:spcBef>
+                <a:spcPts val="0"/>
+              </a:spcBef>
+              <a:spcAft>
+                <a:spcPts val="0"/>
+              </a:spcAft>
+              <a:buNone/>
+            </a:pPr>
+            <a:r>
+              <a:rPr lang="en">
+                <a:solidFill>
+                  <a:srgbClr val="FFFFFF"/>
+                </a:solidFill>
+              </a:rPr>
+              <a:t>                                     </a:t>
+            </a:r>
+            <a:r>
+              <a:rPr lang="en" sz="2300">
+                <a:solidFill>
+                  <a:srgbClr val="FFFFFF"/>
+                </a:solidFill>
+              </a:rPr>
+              <a:t> Git add [  ]</a:t>
+            </a:r>
+            <a:endParaRPr sz="2300">
+              <a:solidFill>
+                <a:srgbClr val="FFFFFF"/>
+              </a:solidFill>
+            </a:endParaRPr>
+          </a:p>
+          <a:p>
+            <a:pPr indent="0" lvl="0" marL="0" rtl="0" algn="just">
+              <a:lnSpc>
+                <a:spcPct val="115000"/>
+              </a:lnSpc>
+              <a:spcBef>
+                <a:spcPts val="0"/>
+              </a:spcBef>
+              <a:spcAft>
+                <a:spcPts val="0"/>
+              </a:spcAft>
+              <a:buNone/>
+            </a:pPr>
+            <a:r>
+              <a:t/>
+            </a:r>
+            <a:endParaRPr>
+              <a:solidFill>
+                <a:srgbClr val="FFFFFF"/>
+              </a:solidFill>
+            </a:endParaRPr>
+          </a:p>
+          <a:p>
+            <a:pPr indent="0" lvl="0" marL="0" rtl="0" algn="just">
+              <a:spcBef>
+                <a:spcPts val="0"/>
+              </a:spcBef>
+              <a:spcAft>
+                <a:spcPts val="0"/>
+              </a:spcAft>
+              <a:buNone/>
+            </a:pPr>
+            <a:r>
+              <a:t/>
+            </a:r>
+            <a:endParaRPr/>
+          </a:p>
+        </p:txBody>
+      </p:sp>
+    </p:spTree>
+  </p:cSld>
+  <p:clrMapOvr>
+    <a:masterClrMapping/>
+  </p:clrMapOvr>
+</p:sld>
+</file>
+
+<file path=ppt/slides/slide3.xml><?xml version="1.0" encoding="utf-8"?>
+<p:sld xmlns:a="http://schemas.openxmlformats.org/drawingml/2006/main" xmlns:r="http://schemas.openxmlformats.org/officeDocument/2006/relationships" xmlns:mc="http://schemas.openxmlformats.org/markup-compatibility/2006" xmlns:mv="urn:schemas-microsoft-com:mac:vml" xmlns:p="http://schemas.openxmlformats.org/presentationml/2006/main" xmlns:c="http://schemas.openxmlformats.org/drawingml/2006/chart" xmlns:dgm="http://schemas.openxmlformats.org/drawingml/2006/diagram" xmlns:o="urn:schemas-microsoft-com:office:office" xmlns:v="urn:schemas-microsoft-com:vml" xmlns:pvml="urn:schemas-microsoft-com:office:powerpoint" xmlns:com="http://schemas.openxmlformats.org/drawingml/2006/compatibility" xmlns:p14="http://schemas.microsoft.com/office/powerpoint/2010/main" xmlns:p15="http://schemas.microsoft.com/office/powerpoint/2012/main" xmlns:ahyp="http://schemas.microsoft.com/office/drawing/2018/hyperlinkcolor">
+  <p:cSld>
+    <p:spTree>
+      <p:nvGrpSpPr>
+        <p:cNvPr id="77" name="Shape 77"/>
+        <p:cNvGrpSpPr/>
+        <p:nvPr/>
+      </p:nvGrpSpPr>
+      <p:grpSpPr>
+        <a:xfrm>
+          <a:off x="0" y="0"/>
+          <a:ext cx="0" cy="0"/>
+          <a:chOff x="0" y="0"/>
+          <a:chExt cx="0" cy="0"/>
+        </a:xfrm>
+      </p:grpSpPr>
+      <p:sp>
+        <p:nvSpPr>
+          <p:cNvPr id="78" name="Google Shape;78;p15"/>
+          <p:cNvSpPr txBox="1"/>
+          <p:nvPr>
+            <p:ph type="ctrTitle"/>
+          </p:nvPr>
+        </p:nvSpPr>
+        <p:spPr>
+          <a:xfrm>
             <a:off x="1564602" y="95000"/>
             <a:ext cx="5783400" cy="1457400"/>
           </a:xfrm>
@@ -6436,7 +6861,7 @@
       </p:sp>
       <p:sp>
         <p:nvSpPr>
-          <p:cNvPr id="73" name="Google Shape;73;p14"/>
+          <p:cNvPr id="79" name="Google Shape;79;p15"/>
           <p:cNvSpPr txBox="1"/>
           <p:nvPr>
             <p:ph idx="1" type="subTitle"/>
@@ -6475,7 +6900,7 @@
       </p:sp>
       <p:pic>
         <p:nvPicPr>
-          <p:cNvPr id="74" name="Google Shape;74;p14"/>
+          <p:cNvPr id="80" name="Google Shape;80;p15"/>
           <p:cNvPicPr preferRelativeResize="0"/>
           <p:nvPr/>
         </p:nvPicPr>

</xml_diff>